<commit_message>
Mapa conceptual guión 02
Revisión del mapa conceptual del guión
</commit_message>
<xml_diff>
--- a/fuentes/contenidos/grado06/guion02/MA_06_02_CO_Mapa conceptual.pptx
+++ b/fuentes/contenidos/grado06/guion02/MA_06_02_CO_Mapa conceptual.pptx
@@ -108,7 +108,7 @@
   </p:defaultTextStyle>
   <p:extLst>
     <p:ext uri="{EFAFB233-063F-42B5-8137-9DF3F51BA10A}">
-      <p15:sldGuideLst xmlns:p15="http://schemas.microsoft.com/office/powerpoint/2012/main">
+      <p15:sldGuideLst xmlns:p15="http://schemas.microsoft.com/office/powerpoint/2012/main" xmlns="">
         <p15:guide id="1" orient="horz" pos="2160">
           <p15:clr>
             <a:srgbClr val="A4A3A4"/>
@@ -155,7 +155,7 @@
   <p:timing>
     <p:tnLst>
       <p:par>
-        <p:cTn id="1" dur="indefinite" restart="never" nodeType="tmRoot"/>
+        <p:cTn xmlns:p14="http://schemas.microsoft.com/office/powerpoint/2010/main" id="1" dur="indefinite" restart="never" nodeType="tmRoot"/>
       </p:par>
     </p:tnLst>
   </p:timing>
@@ -192,7 +192,7 @@
   <p:timing>
     <p:tnLst>
       <p:par>
-        <p:cTn id="1" dur="indefinite" restart="never" nodeType="tmRoot"/>
+        <p:cTn xmlns:p14="http://schemas.microsoft.com/office/powerpoint/2010/main" id="1" dur="indefinite" restart="never" nodeType="tmRoot"/>
       </p:par>
     </p:tnLst>
   </p:timing>
@@ -229,7 +229,7 @@
   <p:timing>
     <p:tnLst>
       <p:par>
-        <p:cTn id="1" dur="indefinite" restart="never" nodeType="tmRoot"/>
+        <p:cTn xmlns:p14="http://schemas.microsoft.com/office/powerpoint/2010/main" id="1" dur="indefinite" restart="never" nodeType="tmRoot"/>
       </p:par>
     </p:tnLst>
   </p:timing>
@@ -367,7 +367,7 @@
           <a:p>
             <a:fld id="{D753C377-1601-4951-A2FB-AAFCF4178A63}" type="datetimeFigureOut">
               <a:rPr lang="es-CO" smtClean="0"/>
-              <a:t>20/09/2015</a:t>
+              <a:t>25/10/15</a:t>
             </a:fld>
             <a:endParaRPr lang="es-CO"/>
           </a:p>
@@ -409,7 +409,7 @@
           <a:p>
             <a:fld id="{166B6605-EDD6-460A-BEC0-99D067582C15}" type="slidenum">
               <a:rPr lang="es-CO" smtClean="0"/>
-              <a:t>‹Nº›</a:t>
+              <a:t>‹Nr.›</a:t>
             </a:fld>
             <a:endParaRPr lang="es-CO"/>
           </a:p>
@@ -537,7 +537,7 @@
           <a:p>
             <a:fld id="{D753C377-1601-4951-A2FB-AAFCF4178A63}" type="datetimeFigureOut">
               <a:rPr lang="es-CO" smtClean="0"/>
-              <a:t>20/09/2015</a:t>
+              <a:t>25/10/15</a:t>
             </a:fld>
             <a:endParaRPr lang="es-CO"/>
           </a:p>
@@ -579,7 +579,7 @@
           <a:p>
             <a:fld id="{166B6605-EDD6-460A-BEC0-99D067582C15}" type="slidenum">
               <a:rPr lang="es-CO" smtClean="0"/>
-              <a:t>‹Nº›</a:t>
+              <a:t>‹Nr.›</a:t>
             </a:fld>
             <a:endParaRPr lang="es-CO"/>
           </a:p>
@@ -783,7 +783,7 @@
           <a:p>
             <a:fld id="{D753C377-1601-4951-A2FB-AAFCF4178A63}" type="datetimeFigureOut">
               <a:rPr lang="es-CO" smtClean="0"/>
-              <a:t>20/09/2015</a:t>
+              <a:t>25/10/15</a:t>
             </a:fld>
             <a:endParaRPr lang="es-CO"/>
           </a:p>
@@ -825,7 +825,7 @@
           <a:p>
             <a:fld id="{166B6605-EDD6-460A-BEC0-99D067582C15}" type="slidenum">
               <a:rPr lang="es-CO" smtClean="0"/>
-              <a:t>‹Nº›</a:t>
+              <a:t>‹Nr.›</a:t>
             </a:fld>
             <a:endParaRPr lang="es-CO"/>
           </a:p>
@@ -1015,7 +1015,7 @@
           <a:p>
             <a:fld id="{D753C377-1601-4951-A2FB-AAFCF4178A63}" type="datetimeFigureOut">
               <a:rPr lang="es-CO" smtClean="0"/>
-              <a:t>20/09/2015</a:t>
+              <a:t>25/10/15</a:t>
             </a:fld>
             <a:endParaRPr lang="es-CO"/>
           </a:p>
@@ -1057,7 +1057,7 @@
           <a:p>
             <a:fld id="{166B6605-EDD6-460A-BEC0-99D067582C15}" type="slidenum">
               <a:rPr lang="es-CO" smtClean="0"/>
-              <a:t>‹Nº›</a:t>
+              <a:t>‹Nr.›</a:t>
             </a:fld>
             <a:endParaRPr lang="es-CO"/>
           </a:p>
@@ -1382,7 +1382,7 @@
           <a:p>
             <a:fld id="{D753C377-1601-4951-A2FB-AAFCF4178A63}" type="datetimeFigureOut">
               <a:rPr lang="es-CO" smtClean="0"/>
-              <a:t>20/09/2015</a:t>
+              <a:t>25/10/15</a:t>
             </a:fld>
             <a:endParaRPr lang="es-CO"/>
           </a:p>
@@ -1424,7 +1424,7 @@
           <a:p>
             <a:fld id="{166B6605-EDD6-460A-BEC0-99D067582C15}" type="slidenum">
               <a:rPr lang="es-CO" smtClean="0"/>
-              <a:t>‹Nº›</a:t>
+              <a:t>‹Nr.›</a:t>
             </a:fld>
             <a:endParaRPr lang="es-CO"/>
           </a:p>
@@ -1500,7 +1500,7 @@
           <a:p>
             <a:fld id="{D753C377-1601-4951-A2FB-AAFCF4178A63}" type="datetimeFigureOut">
               <a:rPr lang="es-CO" smtClean="0"/>
-              <a:t>20/09/2015</a:t>
+              <a:t>25/10/15</a:t>
             </a:fld>
             <a:endParaRPr lang="es-CO"/>
           </a:p>
@@ -1542,7 +1542,7 @@
           <a:p>
             <a:fld id="{166B6605-EDD6-460A-BEC0-99D067582C15}" type="slidenum">
               <a:rPr lang="es-CO" smtClean="0"/>
-              <a:t>‹Nº›</a:t>
+              <a:t>‹Nr.›</a:t>
             </a:fld>
             <a:endParaRPr lang="es-CO"/>
           </a:p>
@@ -1595,7 +1595,7 @@
           <a:p>
             <a:fld id="{D753C377-1601-4951-A2FB-AAFCF4178A63}" type="datetimeFigureOut">
               <a:rPr lang="es-CO" smtClean="0"/>
-              <a:t>20/09/2015</a:t>
+              <a:t>25/10/15</a:t>
             </a:fld>
             <a:endParaRPr lang="es-CO"/>
           </a:p>
@@ -1637,7 +1637,7 @@
           <a:p>
             <a:fld id="{166B6605-EDD6-460A-BEC0-99D067582C15}" type="slidenum">
               <a:rPr lang="es-CO" smtClean="0"/>
-              <a:t>‹Nº›</a:t>
+              <a:t>‹Nr.›</a:t>
             </a:fld>
             <a:endParaRPr lang="es-CO"/>
           </a:p>
@@ -1872,7 +1872,7 @@
           <a:p>
             <a:fld id="{D753C377-1601-4951-A2FB-AAFCF4178A63}" type="datetimeFigureOut">
               <a:rPr lang="es-CO" smtClean="0"/>
-              <a:t>20/09/2015</a:t>
+              <a:t>25/10/15</a:t>
             </a:fld>
             <a:endParaRPr lang="es-CO"/>
           </a:p>
@@ -1914,7 +1914,7 @@
           <a:p>
             <a:fld id="{166B6605-EDD6-460A-BEC0-99D067582C15}" type="slidenum">
               <a:rPr lang="es-CO" smtClean="0"/>
-              <a:t>‹Nº›</a:t>
+              <a:t>‹Nr.›</a:t>
             </a:fld>
             <a:endParaRPr lang="es-CO"/>
           </a:p>
@@ -1963,7 +1963,7 @@
   <p:timing>
     <p:tnLst>
       <p:par>
-        <p:cTn id="1" dur="indefinite" restart="never" nodeType="tmRoot"/>
+        <p:cTn xmlns:p14="http://schemas.microsoft.com/office/powerpoint/2010/main" id="1" dur="indefinite" restart="never" nodeType="tmRoot"/>
       </p:par>
     </p:tnLst>
   </p:timing>
@@ -2162,7 +2162,7 @@
           <a:p>
             <a:fld id="{D753C377-1601-4951-A2FB-AAFCF4178A63}" type="datetimeFigureOut">
               <a:rPr lang="es-CO" smtClean="0"/>
-              <a:t>20/09/2015</a:t>
+              <a:t>25/10/15</a:t>
             </a:fld>
             <a:endParaRPr lang="es-CO"/>
           </a:p>
@@ -2204,7 +2204,7 @@
           <a:p>
             <a:fld id="{166B6605-EDD6-460A-BEC0-99D067582C15}" type="slidenum">
               <a:rPr lang="es-CO" smtClean="0"/>
-              <a:t>‹Nº›</a:t>
+              <a:t>‹Nr.›</a:t>
             </a:fld>
             <a:endParaRPr lang="es-CO"/>
           </a:p>
@@ -2332,7 +2332,7 @@
           <a:p>
             <a:fld id="{D753C377-1601-4951-A2FB-AAFCF4178A63}" type="datetimeFigureOut">
               <a:rPr lang="es-CO" smtClean="0"/>
-              <a:t>20/09/2015</a:t>
+              <a:t>25/10/15</a:t>
             </a:fld>
             <a:endParaRPr lang="es-CO"/>
           </a:p>
@@ -2374,7 +2374,7 @@
           <a:p>
             <a:fld id="{166B6605-EDD6-460A-BEC0-99D067582C15}" type="slidenum">
               <a:rPr lang="es-CO" smtClean="0"/>
-              <a:t>‹Nº›</a:t>
+              <a:t>‹Nr.›</a:t>
             </a:fld>
             <a:endParaRPr lang="es-CO"/>
           </a:p>
@@ -2512,7 +2512,7 @@
           <a:p>
             <a:fld id="{D753C377-1601-4951-A2FB-AAFCF4178A63}" type="datetimeFigureOut">
               <a:rPr lang="es-CO" smtClean="0"/>
-              <a:t>20/09/2015</a:t>
+              <a:t>25/10/15</a:t>
             </a:fld>
             <a:endParaRPr lang="es-CO"/>
           </a:p>
@@ -2554,7 +2554,7 @@
           <a:p>
             <a:fld id="{166B6605-EDD6-460A-BEC0-99D067582C15}" type="slidenum">
               <a:rPr lang="es-CO" smtClean="0"/>
-              <a:t>‹Nº›</a:t>
+              <a:t>‹Nr.›</a:t>
             </a:fld>
             <a:endParaRPr lang="es-CO"/>
           </a:p>
@@ -2704,7 +2704,7 @@
           <a:p>
             <a:fld id="{63A4975C-3C38-4B4F-A092-D12D5E7CDC29}" type="datetimeFigureOut">
               <a:rPr lang="es-CO" smtClean="0"/>
-              <a:t>20/09/2015</a:t>
+              <a:t>25/10/15</a:t>
             </a:fld>
             <a:endParaRPr lang="es-CO"/>
           </a:p>
@@ -2746,7 +2746,7 @@
           <a:p>
             <a:fld id="{5EBC1990-382E-4459-B7D8-8B1AD26C69BA}" type="slidenum">
               <a:rPr lang="es-CO" smtClean="0"/>
-              <a:t>‹Nº›</a:t>
+              <a:t>‹Nr.›</a:t>
             </a:fld>
             <a:endParaRPr lang="es-CO"/>
           </a:p>
@@ -2874,7 +2874,7 @@
           <a:p>
             <a:fld id="{63A4975C-3C38-4B4F-A092-D12D5E7CDC29}" type="datetimeFigureOut">
               <a:rPr lang="es-CO" smtClean="0"/>
-              <a:t>20/09/2015</a:t>
+              <a:t>25/10/15</a:t>
             </a:fld>
             <a:endParaRPr lang="es-CO"/>
           </a:p>
@@ -2916,7 +2916,7 @@
           <a:p>
             <a:fld id="{5EBC1990-382E-4459-B7D8-8B1AD26C69BA}" type="slidenum">
               <a:rPr lang="es-CO" smtClean="0"/>
-              <a:t>‹Nº›</a:t>
+              <a:t>‹Nr.›</a:t>
             </a:fld>
             <a:endParaRPr lang="es-CO"/>
           </a:p>
@@ -3120,7 +3120,7 @@
           <a:p>
             <a:fld id="{63A4975C-3C38-4B4F-A092-D12D5E7CDC29}" type="datetimeFigureOut">
               <a:rPr lang="es-CO" smtClean="0"/>
-              <a:t>20/09/2015</a:t>
+              <a:t>25/10/15</a:t>
             </a:fld>
             <a:endParaRPr lang="es-CO"/>
           </a:p>
@@ -3162,7 +3162,7 @@
           <a:p>
             <a:fld id="{5EBC1990-382E-4459-B7D8-8B1AD26C69BA}" type="slidenum">
               <a:rPr lang="es-CO" smtClean="0"/>
-              <a:t>‹Nº›</a:t>
+              <a:t>‹Nr.›</a:t>
             </a:fld>
             <a:endParaRPr lang="es-CO"/>
           </a:p>
@@ -3352,7 +3352,7 @@
           <a:p>
             <a:fld id="{63A4975C-3C38-4B4F-A092-D12D5E7CDC29}" type="datetimeFigureOut">
               <a:rPr lang="es-CO" smtClean="0"/>
-              <a:t>20/09/2015</a:t>
+              <a:t>25/10/15</a:t>
             </a:fld>
             <a:endParaRPr lang="es-CO"/>
           </a:p>
@@ -3394,7 +3394,7 @@
           <a:p>
             <a:fld id="{5EBC1990-382E-4459-B7D8-8B1AD26C69BA}" type="slidenum">
               <a:rPr lang="es-CO" smtClean="0"/>
-              <a:t>‹Nº›</a:t>
+              <a:t>‹Nr.›</a:t>
             </a:fld>
             <a:endParaRPr lang="es-CO"/>
           </a:p>
@@ -3719,7 +3719,7 @@
           <a:p>
             <a:fld id="{63A4975C-3C38-4B4F-A092-D12D5E7CDC29}" type="datetimeFigureOut">
               <a:rPr lang="es-CO" smtClean="0"/>
-              <a:t>20/09/2015</a:t>
+              <a:t>25/10/15</a:t>
             </a:fld>
             <a:endParaRPr lang="es-CO"/>
           </a:p>
@@ -3761,7 +3761,7 @@
           <a:p>
             <a:fld id="{5EBC1990-382E-4459-B7D8-8B1AD26C69BA}" type="slidenum">
               <a:rPr lang="es-CO" smtClean="0"/>
-              <a:t>‹Nº›</a:t>
+              <a:t>‹Nr.›</a:t>
             </a:fld>
             <a:endParaRPr lang="es-CO"/>
           </a:p>
@@ -3837,7 +3837,7 @@
           <a:p>
             <a:fld id="{63A4975C-3C38-4B4F-A092-D12D5E7CDC29}" type="datetimeFigureOut">
               <a:rPr lang="es-CO" smtClean="0"/>
-              <a:t>20/09/2015</a:t>
+              <a:t>25/10/15</a:t>
             </a:fld>
             <a:endParaRPr lang="es-CO"/>
           </a:p>
@@ -3879,7 +3879,7 @@
           <a:p>
             <a:fld id="{5EBC1990-382E-4459-B7D8-8B1AD26C69BA}" type="slidenum">
               <a:rPr lang="es-CO" smtClean="0"/>
-              <a:t>‹Nº›</a:t>
+              <a:t>‹Nr.›</a:t>
             </a:fld>
             <a:endParaRPr lang="es-CO"/>
           </a:p>
@@ -3932,7 +3932,7 @@
           <a:p>
             <a:fld id="{63A4975C-3C38-4B4F-A092-D12D5E7CDC29}" type="datetimeFigureOut">
               <a:rPr lang="es-CO" smtClean="0"/>
-              <a:t>20/09/2015</a:t>
+              <a:t>25/10/15</a:t>
             </a:fld>
             <a:endParaRPr lang="es-CO"/>
           </a:p>
@@ -3974,7 +3974,7 @@
           <a:p>
             <a:fld id="{5EBC1990-382E-4459-B7D8-8B1AD26C69BA}" type="slidenum">
               <a:rPr lang="es-CO" smtClean="0"/>
-              <a:t>‹Nº›</a:t>
+              <a:t>‹Nr.›</a:t>
             </a:fld>
             <a:endParaRPr lang="es-CO"/>
           </a:p>
@@ -4023,7 +4023,7 @@
   <p:timing>
     <p:tnLst>
       <p:par>
-        <p:cTn id="1" dur="indefinite" restart="never" nodeType="tmRoot"/>
+        <p:cTn xmlns:p14="http://schemas.microsoft.com/office/powerpoint/2010/main" id="1" dur="indefinite" restart="never" nodeType="tmRoot"/>
       </p:par>
     </p:tnLst>
   </p:timing>
@@ -4246,7 +4246,7 @@
           <a:p>
             <a:fld id="{63A4975C-3C38-4B4F-A092-D12D5E7CDC29}" type="datetimeFigureOut">
               <a:rPr lang="es-CO" smtClean="0"/>
-              <a:t>20/09/2015</a:t>
+              <a:t>25/10/15</a:t>
             </a:fld>
             <a:endParaRPr lang="es-CO"/>
           </a:p>
@@ -4288,7 +4288,7 @@
           <a:p>
             <a:fld id="{5EBC1990-382E-4459-B7D8-8B1AD26C69BA}" type="slidenum">
               <a:rPr lang="es-CO" smtClean="0"/>
-              <a:t>‹Nº›</a:t>
+              <a:t>‹Nr.›</a:t>
             </a:fld>
             <a:endParaRPr lang="es-CO"/>
           </a:p>
@@ -4499,7 +4499,7 @@
           <a:p>
             <a:fld id="{63A4975C-3C38-4B4F-A092-D12D5E7CDC29}" type="datetimeFigureOut">
               <a:rPr lang="es-CO" smtClean="0"/>
-              <a:t>20/09/2015</a:t>
+              <a:t>25/10/15</a:t>
             </a:fld>
             <a:endParaRPr lang="es-CO"/>
           </a:p>
@@ -4541,7 +4541,7 @@
           <a:p>
             <a:fld id="{5EBC1990-382E-4459-B7D8-8B1AD26C69BA}" type="slidenum">
               <a:rPr lang="es-CO" smtClean="0"/>
-              <a:t>‹Nº›</a:t>
+              <a:t>‹Nr.›</a:t>
             </a:fld>
             <a:endParaRPr lang="es-CO"/>
           </a:p>
@@ -4669,7 +4669,7 @@
           <a:p>
             <a:fld id="{63A4975C-3C38-4B4F-A092-D12D5E7CDC29}" type="datetimeFigureOut">
               <a:rPr lang="es-CO" smtClean="0"/>
-              <a:t>20/09/2015</a:t>
+              <a:t>25/10/15</a:t>
             </a:fld>
             <a:endParaRPr lang="es-CO"/>
           </a:p>
@@ -4711,7 +4711,7 @@
           <a:p>
             <a:fld id="{5EBC1990-382E-4459-B7D8-8B1AD26C69BA}" type="slidenum">
               <a:rPr lang="es-CO" smtClean="0"/>
-              <a:t>‹Nº›</a:t>
+              <a:t>‹Nr.›</a:t>
             </a:fld>
             <a:endParaRPr lang="es-CO"/>
           </a:p>
@@ -4849,7 +4849,7 @@
           <a:p>
             <a:fld id="{63A4975C-3C38-4B4F-A092-D12D5E7CDC29}" type="datetimeFigureOut">
               <a:rPr lang="es-CO" smtClean="0"/>
-              <a:t>20/09/2015</a:t>
+              <a:t>25/10/15</a:t>
             </a:fld>
             <a:endParaRPr lang="es-CO"/>
           </a:p>
@@ -4891,7 +4891,7 @@
           <a:p>
             <a:fld id="{5EBC1990-382E-4459-B7D8-8B1AD26C69BA}" type="slidenum">
               <a:rPr lang="es-CO" smtClean="0"/>
-              <a:t>‹Nº›</a:t>
+              <a:t>‹Nr.›</a:t>
             </a:fld>
             <a:endParaRPr lang="es-CO"/>
           </a:p>
@@ -4940,7 +4940,7 @@
   <p:timing>
     <p:tnLst>
       <p:par>
-        <p:cTn id="1" dur="indefinite" restart="never" nodeType="tmRoot"/>
+        <p:cTn xmlns:p14="http://schemas.microsoft.com/office/powerpoint/2010/main" id="1" dur="indefinite" restart="never" nodeType="tmRoot"/>
       </p:par>
     </p:tnLst>
   </p:timing>
@@ -4977,7 +4977,7 @@
   <p:timing>
     <p:tnLst>
       <p:par>
-        <p:cTn id="1" dur="indefinite" restart="never" nodeType="tmRoot"/>
+        <p:cTn xmlns:p14="http://schemas.microsoft.com/office/powerpoint/2010/main" id="1" dur="indefinite" restart="never" nodeType="tmRoot"/>
       </p:par>
     </p:tnLst>
   </p:timing>
@@ -5014,7 +5014,7 @@
   <p:timing>
     <p:tnLst>
       <p:par>
-        <p:cTn id="1" dur="indefinite" restart="never" nodeType="tmRoot"/>
+        <p:cTn xmlns:p14="http://schemas.microsoft.com/office/powerpoint/2010/main" id="1" dur="indefinite" restart="never" nodeType="tmRoot"/>
       </p:par>
     </p:tnLst>
   </p:timing>
@@ -5063,7 +5063,7 @@
           <a:p>
             <a:fld id="{5001C876-01F7-4317-94B9-1AE222133113}" type="datetimeFigureOut">
               <a:rPr lang="es-ES" smtClean="0"/>
-              <a:t>20/09/2015</a:t>
+              <a:t>25/10/15</a:t>
             </a:fld>
             <a:endParaRPr lang="es-ES"/>
           </a:p>
@@ -5121,7 +5121,7 @@
           <a:p>
             <a:fld id="{58140F73-F5A2-4B82-A2FA-BF1850CF1309}" type="slidenum">
               <a:rPr lang="es-ES" smtClean="0"/>
-              <a:t>‹Nº›</a:t>
+              <a:t>‹Nr.›</a:t>
             </a:fld>
             <a:endParaRPr lang="es-ES"/>
           </a:p>
@@ -5140,7 +5140,7 @@
   <p:timing>
     <p:tnLst>
       <p:par>
-        <p:cTn id="1" dur="indefinite" restart="never" nodeType="tmRoot"/>
+        <p:cTn xmlns:p14="http://schemas.microsoft.com/office/powerpoint/2010/main" id="1" dur="indefinite" restart="never" nodeType="tmRoot"/>
       </p:par>
     </p:tnLst>
   </p:timing>
@@ -5177,7 +5177,7 @@
   <p:timing>
     <p:tnLst>
       <p:par>
-        <p:cTn id="1" dur="indefinite" restart="never" nodeType="tmRoot"/>
+        <p:cTn xmlns:p14="http://schemas.microsoft.com/office/powerpoint/2010/main" id="1" dur="indefinite" restart="never" nodeType="tmRoot"/>
       </p:par>
     </p:tnLst>
   </p:timing>
@@ -5214,7 +5214,7 @@
   <p:timing>
     <p:tnLst>
       <p:par>
-        <p:cTn id="1" dur="indefinite" restart="never" nodeType="tmRoot"/>
+        <p:cTn xmlns:p14="http://schemas.microsoft.com/office/powerpoint/2010/main" id="1" dur="indefinite" restart="never" nodeType="tmRoot"/>
       </p:par>
     </p:tnLst>
   </p:timing>
@@ -5331,7 +5331,7 @@
   <p:timing>
     <p:tnLst>
       <p:par>
-        <p:cTn id="1" dur="indefinite" restart="never" nodeType="tmRoot"/>
+        <p:cTn xmlns:p14="http://schemas.microsoft.com/office/powerpoint/2010/main" id="1" dur="indefinite" restart="never" nodeType="tmRoot"/>
       </p:par>
     </p:tnLst>
   </p:timing>
@@ -5770,7 +5770,7 @@
           <a:p>
             <a:fld id="{D753C377-1601-4951-A2FB-AAFCF4178A63}" type="datetimeFigureOut">
               <a:rPr lang="es-CO" smtClean="0"/>
-              <a:t>20/09/2015</a:t>
+              <a:t>25/10/15</a:t>
             </a:fld>
             <a:endParaRPr lang="es-CO"/>
           </a:p>
@@ -5848,7 +5848,7 @@
           <a:p>
             <a:fld id="{166B6605-EDD6-460A-BEC0-99D067582C15}" type="slidenum">
               <a:rPr lang="es-CO" smtClean="0"/>
-              <a:t>‹Nº›</a:t>
+              <a:t>‹Nr.›</a:t>
             </a:fld>
             <a:endParaRPr lang="es-CO"/>
           </a:p>
@@ -6310,7 +6310,7 @@
           <a:p>
             <a:fld id="{63A4975C-3C38-4B4F-A092-D12D5E7CDC29}" type="datetimeFigureOut">
               <a:rPr lang="es-CO" smtClean="0"/>
-              <a:t>20/09/2015</a:t>
+              <a:t>25/10/15</a:t>
             </a:fld>
             <a:endParaRPr lang="es-CO"/>
           </a:p>
@@ -6388,7 +6388,7 @@
           <a:p>
             <a:fld id="{5EBC1990-382E-4459-B7D8-8B1AD26C69BA}" type="slidenum">
               <a:rPr lang="es-CO" smtClean="0"/>
-              <a:t>‹Nº›</a:t>
+              <a:t>‹Nr.›</a:t>
             </a:fld>
             <a:endParaRPr lang="es-CO"/>
           </a:p>
@@ -7260,7 +7260,7 @@
                 <a:latin typeface="Arial" panose="020B0604020202020204" pitchFamily="34" charset="0"/>
                 <a:cs typeface="Arial" panose="020B0604020202020204" pitchFamily="34" charset="0"/>
               </a:rPr>
-              <a:t> </a:t>
+              <a:t> = </a:t>
             </a:r>
             <a:r>
               <a:rPr lang="es-CO" sz="900" dirty="0" smtClean="0">
@@ -7270,7 +7270,17 @@
                 <a:latin typeface="Arial" panose="020B0604020202020204" pitchFamily="34" charset="0"/>
                 <a:cs typeface="Arial" panose="020B0604020202020204" pitchFamily="34" charset="0"/>
               </a:rPr>
-              <a:t>= {1, 2, 3, 4,…]</a:t>
+              <a:t>{0, 1</a:t>
+            </a:r>
+            <a:r>
+              <a:rPr lang="es-CO" sz="900" dirty="0" smtClean="0">
+                <a:solidFill>
+                  <a:schemeClr val="tx1"/>
+                </a:solidFill>
+                <a:latin typeface="Arial" panose="020B0604020202020204" pitchFamily="34" charset="0"/>
+                <a:cs typeface="Arial" panose="020B0604020202020204" pitchFamily="34" charset="0"/>
+              </a:rPr>
+              <a:t>, 2, 3, 4,…]</a:t>
             </a:r>
             <a:endParaRPr lang="es-ES" sz="900" dirty="0">
               <a:solidFill>
@@ -9060,7 +9070,27 @@
                 <a:latin typeface="Arial" panose="020B0604020202020204" pitchFamily="34" charset="0"/>
                 <a:cs typeface="Arial" panose="020B0604020202020204" pitchFamily="34" charset="0"/>
               </a:rPr>
-              <a:t>el valor de una cifra cambia según la posición que ocupe.</a:t>
+              <a:t>el valor de una cifra cambia según la posición </a:t>
+            </a:r>
+            <a:r>
+              <a:rPr lang="es-ES" sz="800" smtClean="0">
+                <a:solidFill>
+                  <a:schemeClr val="tx1"/>
+                </a:solidFill>
+                <a:latin typeface="Arial" panose="020B0604020202020204" pitchFamily="34" charset="0"/>
+                <a:cs typeface="Arial" panose="020B0604020202020204" pitchFamily="34" charset="0"/>
+              </a:rPr>
+              <a:t>que </a:t>
+            </a:r>
+            <a:r>
+              <a:rPr lang="es-ES" sz="800" smtClean="0">
+                <a:solidFill>
+                  <a:schemeClr val="tx1"/>
+                </a:solidFill>
+                <a:latin typeface="Arial" panose="020B0604020202020204" pitchFamily="34" charset="0"/>
+                <a:cs typeface="Arial" panose="020B0604020202020204" pitchFamily="34" charset="0"/>
+              </a:rPr>
+              <a:t>ocupe</a:t>
             </a:r>
             <a:endParaRPr lang="es-ES" sz="800" dirty="0">
               <a:solidFill>
@@ -9761,14 +9791,14 @@
                 <a:latin typeface="Arial" panose="020B0604020202020204" pitchFamily="34" charset="0"/>
                 <a:cs typeface="Arial" panose="020B0604020202020204" pitchFamily="34" charset="0"/>
               </a:rPr>
-              <a:t> </a:t>
+              <a:t> los </a:t>
             </a:r>
             <a:r>
               <a:rPr lang="en-US" sz="800" dirty="0" err="1" smtClean="0">
                 <a:latin typeface="Arial" panose="020B0604020202020204" pitchFamily="34" charset="0"/>
                 <a:cs typeface="Arial" panose="020B0604020202020204" pitchFamily="34" charset="0"/>
               </a:rPr>
-              <a:t>los</a:t>
+              <a:t>signos</a:t>
             </a:r>
             <a:r>
               <a:rPr lang="en-US" sz="800" dirty="0" smtClean="0">
@@ -9778,18 +9808,18 @@
               <a:t> </a:t>
             </a:r>
             <a:r>
-              <a:rPr lang="en-US" sz="800" dirty="0" err="1" smtClean="0">
-                <a:latin typeface="Arial" panose="020B0604020202020204" pitchFamily="34" charset="0"/>
-                <a:cs typeface="Arial" panose="020B0604020202020204" pitchFamily="34" charset="0"/>
-              </a:rPr>
-              <a:t>signos</a:t>
-            </a:r>
-            <a:r>
               <a:rPr lang="en-US" sz="800" dirty="0" smtClean="0">
                 <a:latin typeface="Arial" panose="020B0604020202020204" pitchFamily="34" charset="0"/>
                 <a:cs typeface="Arial" panose="020B0604020202020204" pitchFamily="34" charset="0"/>
               </a:rPr>
-              <a:t> 1, 2, 3, 4, 5, 6, 7, 8 y 9</a:t>
+              <a:t>0, 1</a:t>
+            </a:r>
+            <a:r>
+              <a:rPr lang="en-US" sz="800" dirty="0" smtClean="0">
+                <a:latin typeface="Arial" panose="020B0604020202020204" pitchFamily="34" charset="0"/>
+                <a:cs typeface="Arial" panose="020B0604020202020204" pitchFamily="34" charset="0"/>
+              </a:rPr>
+              <a:t>, 2, 3, 4, 5, 6, 7, 8 y 9</a:t>
             </a:r>
           </a:p>
         </p:txBody>
@@ -10509,11 +10539,8 @@
                 <a:latin typeface="Arial" panose="020B0604020202020204" pitchFamily="34" charset="0"/>
                 <a:cs typeface="Arial" panose="020B0604020202020204" pitchFamily="34" charset="0"/>
               </a:rPr>
-              <a:t>mayor que</a:t>
-            </a:r>
-          </a:p>
-          <a:p>
-            <a:pPr algn="ctr"/>
+              <a:t>mayor </a:t>
+            </a:r>
             <a:r>
               <a:rPr lang="es-ES" sz="800" dirty="0" smtClean="0">
                 <a:solidFill>
@@ -10522,8 +10549,35 @@
                 <a:latin typeface="Arial" panose="020B0604020202020204" pitchFamily="34" charset="0"/>
                 <a:cs typeface="Arial" panose="020B0604020202020204" pitchFamily="34" charset="0"/>
               </a:rPr>
-              <a:t>menos que</a:t>
-            </a:r>
+              <a:t>que,</a:t>
+            </a:r>
+            <a:endParaRPr lang="es-ES" sz="800" dirty="0" smtClean="0">
+              <a:solidFill>
+                <a:schemeClr val="tx1"/>
+              </a:solidFill>
+              <a:latin typeface="Arial" panose="020B0604020202020204" pitchFamily="34" charset="0"/>
+              <a:cs typeface="Arial" panose="020B0604020202020204" pitchFamily="34" charset="0"/>
+            </a:endParaRPr>
+          </a:p>
+          <a:p>
+            <a:pPr algn="ctr"/>
+            <a:r>
+              <a:rPr lang="es-ES" sz="800" dirty="0" smtClean="0">
+                <a:solidFill>
+                  <a:schemeClr val="tx1"/>
+                </a:solidFill>
+                <a:latin typeface="Arial" panose="020B0604020202020204" pitchFamily="34" charset="0"/>
+                <a:cs typeface="Arial" panose="020B0604020202020204" pitchFamily="34" charset="0"/>
+              </a:rPr>
+              <a:t>menor que,</a:t>
+            </a:r>
+            <a:endParaRPr lang="es-ES" sz="800" dirty="0" smtClean="0">
+              <a:solidFill>
+                <a:schemeClr val="tx1"/>
+              </a:solidFill>
+              <a:latin typeface="Arial" panose="020B0604020202020204" pitchFamily="34" charset="0"/>
+              <a:cs typeface="Arial" panose="020B0604020202020204" pitchFamily="34" charset="0"/>
+            </a:endParaRPr>
           </a:p>
           <a:p>
             <a:pPr algn="ctr"/>
@@ -10597,17 +10651,7 @@
                 <a:latin typeface="Arial" panose="020B0604020202020204" pitchFamily="34" charset="0"/>
                 <a:cs typeface="Arial" panose="020B0604020202020204" pitchFamily="34" charset="0"/>
               </a:rPr>
-              <a:t>es </a:t>
-            </a:r>
-            <a:r>
-              <a:rPr lang="es-ES" sz="800" dirty="0" smtClean="0">
-                <a:solidFill>
-                  <a:schemeClr val="tx1"/>
-                </a:solidFill>
-                <a:latin typeface="Arial" panose="020B0604020202020204" pitchFamily="34" charset="0"/>
-                <a:cs typeface="Arial" panose="020B0604020202020204" pitchFamily="34" charset="0"/>
-              </a:rPr>
-              <a:t>necesario tener en cuenta los valores posicionales y la cifra que se encuentra en dicho valor posicional</a:t>
+              <a:t>es necesario tener en cuenta los valores posicionales y la cifra que se encuentra en dicho valor posicional</a:t>
             </a:r>
             <a:endParaRPr lang="es-ES" sz="800" dirty="0">
               <a:solidFill>
@@ -11155,7 +11199,7 @@
   <p:timing>
     <p:tnLst>
       <p:par>
-        <p:cTn id="1" dur="indefinite" restart="never" nodeType="tmRoot"/>
+        <p:cTn xmlns:p14="http://schemas.microsoft.com/office/powerpoint/2010/main" id="1" dur="indefinite" restart="never" nodeType="tmRoot"/>
       </p:par>
     </p:tnLst>
   </p:timing>
@@ -11417,7 +11461,7 @@
   <a:extraClrSchemeLst/>
   <a:extLst>
     <a:ext uri="{05A4C25C-085E-4340-85A3-A5531E510DB2}">
-      <thm15:themeFamily xmlns:thm15="http://schemas.microsoft.com/office/thememl/2012/main" name="Office Theme" id="{62F939B6-93AF-4DB8-9C6B-D6C7DFDC589F}" vid="{4A3C46E8-61CC-4603-A589-7422A47A8E4A}"/>
+      <thm15:themeFamily xmlns:thm15="http://schemas.microsoft.com/office/thememl/2012/main" xmlns="" name="Office Theme" id="{62F939B6-93AF-4DB8-9C6B-D6C7DFDC589F}" vid="{4A3C46E8-61CC-4603-A589-7422A47A8E4A}"/>
     </a:ext>
   </a:extLst>
 </a:theme>
@@ -11466,7 +11510,7 @@
     </a:clrScheme>
     <a:fontScheme name="Office">
       <a:majorFont>
-        <a:latin typeface="Calibri Light" panose="020F0302020204030204"/>
+        <a:latin typeface="Calibri Light"/>
         <a:ea typeface=""/>
         <a:cs typeface=""/>
         <a:font script="Jpan" typeface="ＭＳ Ｐゴシック"/>
@@ -11501,7 +11545,7 @@
         <a:font script="Geor" typeface="Sylfaen"/>
       </a:majorFont>
       <a:minorFont>
-        <a:latin typeface="Calibri" panose="020F0502020204030204"/>
+        <a:latin typeface="Calibri"/>
         <a:ea typeface=""/>
         <a:cs typeface=""/>
         <a:font script="Jpan" typeface="ＭＳ Ｐゴシック"/>
@@ -11678,7 +11722,7 @@
   <a:extraClrSchemeLst/>
   <a:extLst>
     <a:ext uri="{05A4C25C-085E-4340-85A3-A5531E510DB2}">
-      <thm15:themeFamily xmlns:thm15="http://schemas.microsoft.com/office/thememl/2012/main" name="Office Theme" id="{62F939B6-93AF-4DB8-9C6B-D6C7DFDC589F}" vid="{4A3C46E8-61CC-4603-A589-7422A47A8E4A}"/>
+      <thm15:themeFamily xmlns:thm15="http://schemas.microsoft.com/office/thememl/2012/main" xmlns="" name="Office Theme" id="{62F939B6-93AF-4DB8-9C6B-D6C7DFDC589F}" vid="{4A3C46E8-61CC-4603-A589-7422A47A8E4A}"/>
     </a:ext>
   </a:extLst>
 </a:theme>
@@ -11727,7 +11771,7 @@
     </a:clrScheme>
     <a:fontScheme name="Office">
       <a:majorFont>
-        <a:latin typeface="Calibri Light" panose="020F0302020204030204"/>
+        <a:latin typeface="Calibri Light"/>
         <a:ea typeface=""/>
         <a:cs typeface=""/>
         <a:font script="Jpan" typeface="ＭＳ Ｐゴシック"/>
@@ -11762,7 +11806,7 @@
         <a:font script="Geor" typeface="Sylfaen"/>
       </a:majorFont>
       <a:minorFont>
-        <a:latin typeface="Calibri" panose="020F0502020204030204"/>
+        <a:latin typeface="Calibri"/>
         <a:ea typeface=""/>
         <a:cs typeface=""/>
         <a:font script="Jpan" typeface="ＭＳ Ｐゴシック"/>
@@ -11939,7 +11983,7 @@
   <a:extraClrSchemeLst/>
   <a:extLst>
     <a:ext uri="{05A4C25C-085E-4340-85A3-A5531E510DB2}">
-      <thm15:themeFamily xmlns:thm15="http://schemas.microsoft.com/office/thememl/2012/main" name="Office Theme" id="{62F939B6-93AF-4DB8-9C6B-D6C7DFDC589F}" vid="{4A3C46E8-61CC-4603-A589-7422A47A8E4A}"/>
+      <thm15:themeFamily xmlns:thm15="http://schemas.microsoft.com/office/thememl/2012/main" xmlns="" name="Office Theme" id="{62F939B6-93AF-4DB8-9C6B-D6C7DFDC589F}" vid="{4A3C46E8-61CC-4603-A589-7422A47A8E4A}"/>
     </a:ext>
   </a:extLst>
 </a:theme>

</xml_diff>